<commit_message>
Presentation almost ready, Patrones by @mgtapia missing
</commit_message>
<xml_diff>
--- a/Presentacion final/Presentacion.pptx
+++ b/Presentacion final/Presentacion.pptx
@@ -15,7 +15,6 @@
     <p:sldId id="260" r:id="rId12"/>
     <p:sldId id="261" r:id="rId13"/>
     <p:sldId id="262" r:id="rId14"/>
-    <p:sldId id="263" r:id="rId15"/>
   </p:sldIdLst>
   <p:sldSz cx="13004800" cy="9753600"/>
   <p:notesSz cx="6858000" cy="9144000"/>
@@ -3899,77 +3898,6 @@
 </p:sld>
 </file>
 
-<file path=ppt/slides/slide8.xml><?xml version="1.0" encoding="utf-8"?>
-<p:sld xmlns:a="http://schemas.openxmlformats.org/drawingml/2006/main" xmlns:r="http://schemas.openxmlformats.org/officeDocument/2006/relationships" xmlns:p="http://schemas.openxmlformats.org/presentationml/2006/main" showMasterSp="1" showMasterPhAnim="1">
-  <p:cSld>
-    <p:spTree>
-      <p:nvGrpSpPr>
-        <p:cNvPr id="1" name=""/>
-        <p:cNvGrpSpPr/>
-        <p:nvPr/>
-      </p:nvGrpSpPr>
-      <p:grpSpPr>
-        <a:xfrm>
-          <a:off x="0" y="0"/>
-          <a:ext cx="0" cy="0"/>
-          <a:chOff x="0" y="0"/>
-          <a:chExt cx="0" cy="0"/>
-        </a:xfrm>
-      </p:grpSpPr>
-      <p:sp>
-        <p:nvSpPr>
-          <p:cNvPr id="145" name="Shape 145"/>
-          <p:cNvSpPr/>
-          <p:nvPr>
-            <p:ph type="title"/>
-          </p:nvPr>
-        </p:nvSpPr>
-        <p:spPr>
-          <a:prstGeom prst="rect">
-            <a:avLst/>
-          </a:prstGeom>
-        </p:spPr>
-        <p:txBody>
-          <a:bodyPr/>
-          <a:lstStyle/>
-          <a:p>
-            <a:pPr/>
-            <a:r>
-              <a:t>Patrones</a:t>
-            </a:r>
-          </a:p>
-        </p:txBody>
-      </p:sp>
-      <p:sp>
-        <p:nvSpPr>
-          <p:cNvPr id="146" name="Shape 146"/>
-          <p:cNvSpPr/>
-          <p:nvPr>
-            <p:ph type="body" idx="1"/>
-          </p:nvPr>
-        </p:nvSpPr>
-        <p:spPr>
-          <a:prstGeom prst="rect">
-            <a:avLst/>
-          </a:prstGeom>
-        </p:spPr>
-        <p:txBody>
-          <a:bodyPr/>
-          <a:lstStyle/>
-          <a:p>
-            <a:pPr/>
-          </a:p>
-        </p:txBody>
-      </p:sp>
-    </p:spTree>
-  </p:cSld>
-  <p:clrMapOvr>
-    <a:masterClrMapping/>
-  </p:clrMapOvr>
-  <p:transition xmlns:p14="http://schemas.microsoft.com/office/powerpoint/2010/main" spd="med" advClick="1" p14:dur="1000"/>
-</p:sld>
-</file>
-
 <file path=ppt/theme/theme1.xml><?xml version="1.0" encoding="utf-8"?>
 <a:theme xmlns:a="http://schemas.openxmlformats.org/drawingml/2006/main" xmlns:r="http://schemas.openxmlformats.org/officeDocument/2006/relationships" name="Gradient">
   <a:themeElements>

</xml_diff>